<commit_message>
detectron2 is not for Window10
Note: Detectron2 cannot install sucessfully under Window10
</commit_message>
<xml_diff>
--- a/05_Implement.pptx
+++ b/05_Implement.pptx
@@ -5,13 +5,16 @@
     <p:sldMasterId id="2147483648" r:id="rId1"/>
   </p:sldMasterIdLst>
   <p:notesMasterIdLst>
-    <p:notesMasterId r:id="rId6"/>
+    <p:notesMasterId r:id="rId9"/>
   </p:notesMasterIdLst>
   <p:sldIdLst>
     <p:sldId id="270" r:id="rId2"/>
-    <p:sldId id="278" r:id="rId3"/>
+    <p:sldId id="282" r:id="rId3"/>
     <p:sldId id="280" r:id="rId4"/>
-    <p:sldId id="259" r:id="rId5"/>
+    <p:sldId id="281" r:id="rId5"/>
+    <p:sldId id="283" r:id="rId6"/>
+    <p:sldId id="284" r:id="rId7"/>
+    <p:sldId id="259" r:id="rId8"/>
   </p:sldIdLst>
   <p:sldSz cx="9144000" cy="6858000" type="screen4x3"/>
   <p:notesSz cx="6858000" cy="9144000"/>
@@ -3681,8 +3684,8 @@
         </p:nvSpPr>
         <p:spPr>
           <a:xfrm>
-            <a:off x="467544" y="1268759"/>
-            <a:ext cx="8352928" cy="1584177"/>
+            <a:off x="467544" y="1268758"/>
+            <a:ext cx="8352928" cy="2347329"/>
           </a:xfrm>
           <a:ln>
             <a:solidFill>
@@ -3745,7 +3748,7 @@
                   <a:schemeClr val="tx1"/>
                 </a:solidFill>
               </a:rPr>
-              <a:t># Install dependencies: </a:t>
+              <a:t>Error below:</a:t>
             </a:r>
           </a:p>
           <a:p>
@@ -3763,7 +3766,7 @@
                   <a:schemeClr val="tx1"/>
                 </a:solidFill>
               </a:rPr>
-              <a:t>&gt; pip install -U torch==1.5 </a:t>
+              <a:t>&gt; pip install -U '</a:t>
             </a:r>
             <a:r>
               <a:rPr lang="en-US" sz="1400" dirty="0" err="1">
@@ -3771,7 +3774,7 @@
                   <a:schemeClr val="tx1"/>
                 </a:solidFill>
               </a:rPr>
-              <a:t>torchvision</a:t>
+              <a:t>git+https</a:t>
             </a:r>
             <a:r>
               <a:rPr lang="en-US" sz="1400" dirty="0">
@@ -3779,7 +3782,55 @@
                   <a:schemeClr val="tx1"/>
                 </a:solidFill>
               </a:rPr>
-              <a:t>==0.6 -f https://download.pytorch.org/whl/cu101/torch_stable.html</a:t>
+              <a:t>://github.com/</a:t>
+            </a:r>
+            <a:r>
+              <a:rPr lang="en-US" sz="1400" dirty="0" err="1">
+                <a:solidFill>
+                  <a:schemeClr val="tx1"/>
+                </a:solidFill>
+              </a:rPr>
+              <a:t>cocodataset</a:t>
+            </a:r>
+            <a:r>
+              <a:rPr lang="en-US" sz="1400" dirty="0">
+                <a:solidFill>
+                  <a:schemeClr val="tx1"/>
+                </a:solidFill>
+              </a:rPr>
+              <a:t>/</a:t>
+            </a:r>
+            <a:r>
+              <a:rPr lang="en-US" sz="1400" dirty="0" err="1">
+                <a:solidFill>
+                  <a:schemeClr val="tx1"/>
+                </a:solidFill>
+              </a:rPr>
+              <a:t>cocoapi.git#subdirectory</a:t>
+            </a:r>
+            <a:r>
+              <a:rPr lang="en-US" sz="1400" dirty="0">
+                <a:solidFill>
+                  <a:schemeClr val="tx1"/>
+                </a:solidFill>
+              </a:rPr>
+              <a:t>=</a:t>
+            </a:r>
+            <a:r>
+              <a:rPr lang="en-US" sz="1400" dirty="0" err="1">
+                <a:solidFill>
+                  <a:schemeClr val="tx1"/>
+                </a:solidFill>
+              </a:rPr>
+              <a:t>PythonAPI</a:t>
+            </a:r>
+            <a:r>
+              <a:rPr lang="en-US" sz="1400" dirty="0">
+                <a:solidFill>
+                  <a:schemeClr val="tx1"/>
+                </a:solidFill>
+              </a:rPr>
+              <a:t>’ </a:t>
             </a:r>
           </a:p>
           <a:p>
@@ -3797,7 +3848,7 @@
                   <a:schemeClr val="tx1"/>
                 </a:solidFill>
               </a:rPr>
-              <a:t>&gt; pip install </a:t>
+              <a:t>How to install </a:t>
             </a:r>
             <a:r>
               <a:rPr lang="en-US" sz="1400" dirty="0" err="1">
@@ -3805,7 +3856,7 @@
                   <a:schemeClr val="tx1"/>
                 </a:solidFill>
               </a:rPr>
-              <a:t>cython</a:t>
+              <a:t>cocodataset</a:t>
             </a:r>
             <a:r>
               <a:rPr lang="en-US" sz="1400" dirty="0">
@@ -3813,23 +3864,7 @@
                   <a:schemeClr val="tx1"/>
                 </a:solidFill>
               </a:rPr>
-              <a:t> </a:t>
-            </a:r>
-            <a:r>
-              <a:rPr lang="en-US" sz="1400" dirty="0" err="1">
-                <a:solidFill>
-                  <a:schemeClr val="tx1"/>
-                </a:solidFill>
-              </a:rPr>
-              <a:t>pyyaml</a:t>
-            </a:r>
-            <a:r>
-              <a:rPr lang="en-US" sz="1400" dirty="0">
-                <a:solidFill>
-                  <a:schemeClr val="tx1"/>
-                </a:solidFill>
-              </a:rPr>
-              <a:t>==5.1</a:t>
+              <a:t>?</a:t>
             </a:r>
           </a:p>
           <a:p>
@@ -3843,76 +3878,15 @@
             </a:pPr>
             <a:r>
               <a:rPr lang="en-US" sz="1400" dirty="0">
-                <a:solidFill>
-                  <a:schemeClr val="tx1"/>
-                </a:solidFill>
+                <a:hlinkClick r:id="rId3"/>
               </a:rPr>
-              <a:t>&gt; pip install -U '</a:t>
-            </a:r>
-            <a:r>
-              <a:rPr lang="en-US" sz="1400" dirty="0" err="1">
-                <a:solidFill>
-                  <a:schemeClr val="tx1"/>
-                </a:solidFill>
-              </a:rPr>
-              <a:t>git+https</a:t>
-            </a:r>
-            <a:r>
-              <a:rPr lang="en-US" sz="1400" dirty="0">
-                <a:solidFill>
-                  <a:schemeClr val="tx1"/>
-                </a:solidFill>
-              </a:rPr>
-              <a:t>://github.com/</a:t>
-            </a:r>
-            <a:r>
-              <a:rPr lang="en-US" sz="1400" dirty="0" err="1">
-                <a:solidFill>
-                  <a:schemeClr val="tx1"/>
-                </a:solidFill>
-              </a:rPr>
-              <a:t>cocodataset</a:t>
-            </a:r>
-            <a:r>
-              <a:rPr lang="en-US" sz="1400" dirty="0">
-                <a:solidFill>
-                  <a:schemeClr val="tx1"/>
-                </a:solidFill>
-              </a:rPr>
-              <a:t>/</a:t>
-            </a:r>
-            <a:r>
-              <a:rPr lang="en-US" sz="1400" dirty="0" err="1">
-                <a:solidFill>
-                  <a:schemeClr val="tx1"/>
-                </a:solidFill>
-              </a:rPr>
-              <a:t>cocoapi.git#subdirectory</a:t>
-            </a:r>
-            <a:r>
-              <a:rPr lang="en-US" sz="1400" dirty="0">
-                <a:solidFill>
-                  <a:schemeClr val="tx1"/>
-                </a:solidFill>
-              </a:rPr>
-              <a:t>=</a:t>
-            </a:r>
-            <a:r>
-              <a:rPr lang="en-US" sz="1400" dirty="0" err="1">
-                <a:solidFill>
-                  <a:schemeClr val="tx1"/>
-                </a:solidFill>
-              </a:rPr>
-              <a:t>PythonAPI</a:t>
-            </a:r>
-            <a:r>
-              <a:rPr lang="en-US" sz="1400" dirty="0">
-                <a:solidFill>
-                  <a:schemeClr val="tx1"/>
-                </a:solidFill>
-              </a:rPr>
-              <a:t>' </a:t>
-            </a:r>
+              <a:t>https://stackoverflow.com/questions/49311195/how-to-install-coco-pythonapi-in-python3</a:t>
+            </a:r>
+            <a:endParaRPr lang="en-US" sz="1400" dirty="0">
+              <a:solidFill>
+                <a:schemeClr val="tx1"/>
+              </a:solidFill>
+            </a:endParaRPr>
           </a:p>
           <a:p>
             <a:pPr marL="342900" indent="-342900" algn="l">
@@ -3923,11 +3897,50 @@
               <a:buFont typeface="Wingdings" pitchFamily="2" charset="2"/>
               <a:buChar char="u"/>
             </a:pPr>
-            <a:endParaRPr lang="en-US" sz="1400" dirty="0">
-              <a:solidFill>
-                <a:schemeClr val="tx1"/>
-              </a:solidFill>
-            </a:endParaRPr>
+            <a:r>
+              <a:rPr lang="en-US" sz="1400" dirty="0">
+                <a:solidFill>
+                  <a:schemeClr val="tx1"/>
+                </a:solidFill>
+              </a:rPr>
+              <a:t>&gt; git clonehttp://github.com/cocodataset/cocoapt.giy</a:t>
+            </a:r>
+          </a:p>
+          <a:p>
+            <a:pPr marL="342900" indent="-342900" algn="l">
+              <a:buClr>
+                <a:srgbClr val="0070C0"/>
+              </a:buClr>
+              <a:buSzPct val="80000"/>
+              <a:buFont typeface="Wingdings" pitchFamily="2" charset="2"/>
+              <a:buChar char="u"/>
+            </a:pPr>
+            <a:r>
+              <a:rPr lang="en-US" sz="1400" dirty="0">
+                <a:solidFill>
+                  <a:schemeClr val="tx1"/>
+                </a:solidFill>
+              </a:rPr>
+              <a:t>&gt; 2to3 . –w</a:t>
+            </a:r>
+          </a:p>
+          <a:p>
+            <a:pPr marL="342900" indent="-342900" algn="l">
+              <a:buClr>
+                <a:srgbClr val="0070C0"/>
+              </a:buClr>
+              <a:buSzPct val="80000"/>
+              <a:buFont typeface="Wingdings" pitchFamily="2" charset="2"/>
+              <a:buChar char="u"/>
+            </a:pPr>
+            <a:r>
+              <a:rPr lang="en-US" sz="1400" dirty="0">
+                <a:solidFill>
+                  <a:schemeClr val="tx1"/>
+                </a:solidFill>
+              </a:rPr>
+              <a:t>&gt; python3 setup.py install</a:t>
+            </a:r>
           </a:p>
         </p:txBody>
       </p:sp>
@@ -4058,10 +4071,10 @@
       </p:sp>
       <p:pic>
         <p:nvPicPr>
-          <p:cNvPr id="9" name="Picture 8">
+          <p:cNvPr id="8" name="Picture 7">
             <a:extLst>
               <a:ext uri="{FF2B5EF4-FFF2-40B4-BE49-F238E27FC236}">
-                <a16:creationId xmlns:a16="http://schemas.microsoft.com/office/drawing/2014/main" id="{7C95E1D2-0DA2-49FD-BF0E-CAC2FEFC5274}"/>
+                <a16:creationId xmlns:a16="http://schemas.microsoft.com/office/drawing/2014/main" id="{91684D66-7DC5-4E1E-AAD1-8C272F649C9A}"/>
               </a:ext>
             </a:extLst>
           </p:cNvPr>
@@ -4071,15 +4084,15 @@
           <p:nvPr/>
         </p:nvPicPr>
         <p:blipFill>
-          <a:blip r:embed="rId3"/>
+          <a:blip r:embed="rId4"/>
           <a:stretch>
             <a:fillRect/>
           </a:stretch>
         </p:blipFill>
         <p:spPr>
           <a:xfrm>
-            <a:off x="1187624" y="2996951"/>
-            <a:ext cx="6300192" cy="2849626"/>
+            <a:off x="777280" y="3760101"/>
+            <a:ext cx="7909520" cy="2173484"/>
           </a:xfrm>
           <a:prstGeom prst="rect">
             <a:avLst/>
@@ -4094,7 +4107,7 @@
     </p:spTree>
     <p:extLst>
       <p:ext uri="{BB962C8B-B14F-4D97-AF65-F5344CB8AC3E}">
-        <p14:creationId xmlns:p14="http://schemas.microsoft.com/office/powerpoint/2010/main" val="3962801643"/>
+        <p14:creationId xmlns:p14="http://schemas.microsoft.com/office/powerpoint/2010/main" val="3100401371"/>
       </p:ext>
     </p:extLst>
   </p:cSld>
@@ -4501,6 +4514,1031 @@
         </p:nvSpPr>
         <p:spPr>
           <a:xfrm>
+            <a:off x="0" y="1"/>
+            <a:ext cx="9144000" cy="764704"/>
+          </a:xfrm>
+          <a:gradFill flip="none" rotWithShape="1">
+            <a:gsLst>
+              <a:gs pos="0">
+                <a:srgbClr val="C00000">
+                  <a:shade val="30000"/>
+                  <a:satMod val="115000"/>
+                </a:srgbClr>
+              </a:gs>
+              <a:gs pos="50000">
+                <a:srgbClr val="C00000">
+                  <a:shade val="67500"/>
+                  <a:satMod val="115000"/>
+                </a:srgbClr>
+              </a:gs>
+              <a:gs pos="100000">
+                <a:srgbClr val="C00000">
+                  <a:shade val="100000"/>
+                  <a:satMod val="115000"/>
+                </a:srgbClr>
+              </a:gs>
+            </a:gsLst>
+            <a:path path="circle">
+              <a:fillToRect t="100000" r="100000"/>
+            </a:path>
+            <a:tileRect l="-100000" b="-100000"/>
+          </a:gradFill>
+        </p:spPr>
+        <p:txBody>
+          <a:bodyPr>
+            <a:normAutofit/>
+          </a:bodyPr>
+          <a:lstStyle/>
+          <a:p>
+            <a:pPr algn="l"/>
+            <a:r>
+              <a:rPr lang="en-US" altLang="zh-TW" b="1" dirty="0">
+                <a:solidFill>
+                  <a:srgbClr val="FFFF00"/>
+                </a:solidFill>
+              </a:rPr>
+              <a:t>5 Implement</a:t>
+            </a:r>
+            <a:endParaRPr lang="zh-TW" altLang="en-US" b="1" dirty="0">
+              <a:solidFill>
+                <a:srgbClr val="FFFF00"/>
+              </a:solidFill>
+            </a:endParaRPr>
+          </a:p>
+        </p:txBody>
+      </p:sp>
+      <p:sp>
+        <p:nvSpPr>
+          <p:cNvPr id="3" name="副標題 2"/>
+          <p:cNvSpPr>
+            <a:spLocks noGrp="1"/>
+          </p:cNvSpPr>
+          <p:nvPr>
+            <p:ph type="subTitle" idx="1"/>
+          </p:nvPr>
+        </p:nvSpPr>
+        <p:spPr>
+          <a:xfrm>
+            <a:off x="467544" y="1268758"/>
+            <a:ext cx="8352928" cy="1688011"/>
+          </a:xfrm>
+          <a:ln>
+            <a:solidFill>
+              <a:srgbClr val="C00000"/>
+            </a:solidFill>
+          </a:ln>
+        </p:spPr>
+        <p:txBody>
+          <a:bodyPr>
+            <a:noAutofit/>
+          </a:bodyPr>
+          <a:lstStyle/>
+          <a:p>
+            <a:pPr marL="342900" indent="-342900" algn="l">
+              <a:buClr>
+                <a:srgbClr val="0070C0"/>
+              </a:buClr>
+              <a:buSzPct val="80000"/>
+              <a:buFont typeface="Wingdings" pitchFamily="2" charset="2"/>
+              <a:buChar char="u"/>
+            </a:pPr>
+            <a:r>
+              <a:rPr lang="en-US" sz="1800" dirty="0">
+                <a:hlinkClick r:id="rId2"/>
+              </a:rPr>
+              <a:t>https://www.youtube.com/watch?v=8eLHZ0R5nHQ&amp;t=11s</a:t>
+            </a:r>
+            <a:endParaRPr lang="en-US" sz="1800" dirty="0"/>
+          </a:p>
+          <a:p>
+            <a:pPr marL="342900" indent="-342900" algn="l">
+              <a:buClr>
+                <a:srgbClr val="0070C0"/>
+              </a:buClr>
+              <a:buSzPct val="80000"/>
+              <a:buFont typeface="Wingdings" pitchFamily="2" charset="2"/>
+              <a:buChar char="u"/>
+            </a:pPr>
+            <a:r>
+              <a:rPr lang="en-US" sz="1800" dirty="0">
+                <a:solidFill>
+                  <a:schemeClr val="tx1"/>
+                </a:solidFill>
+              </a:rPr>
+              <a:t>9:56/1:07:20</a:t>
+            </a:r>
+          </a:p>
+          <a:p>
+            <a:pPr marL="342900" indent="-342900" algn="l">
+              <a:buClr>
+                <a:srgbClr val="0070C0"/>
+              </a:buClr>
+              <a:buSzPct val="80000"/>
+              <a:buFont typeface="Wingdings" pitchFamily="2" charset="2"/>
+              <a:buChar char="u"/>
+            </a:pPr>
+            <a:r>
+              <a:rPr lang="en-US" sz="1800" dirty="0">
+                <a:solidFill>
+                  <a:schemeClr val="tx1"/>
+                </a:solidFill>
+              </a:rPr>
+              <a:t>Clone the dectron2</a:t>
+            </a:r>
+          </a:p>
+          <a:p>
+            <a:pPr marL="342900" indent="-342900" algn="l">
+              <a:buClr>
+                <a:srgbClr val="0070C0"/>
+              </a:buClr>
+              <a:buSzPct val="80000"/>
+              <a:buFont typeface="Wingdings" pitchFamily="2" charset="2"/>
+              <a:buChar char="u"/>
+            </a:pPr>
+            <a:r>
+              <a:rPr lang="en-US" sz="1800" dirty="0">
+                <a:solidFill>
+                  <a:schemeClr val="tx1"/>
+                </a:solidFill>
+              </a:rPr>
+              <a:t>&gt; git clone https://github.com/facebookresearch/detectron2 detectron2_repo</a:t>
+            </a:r>
+          </a:p>
+          <a:p>
+            <a:pPr marL="342900" indent="-342900" algn="l">
+              <a:buClr>
+                <a:srgbClr val="0070C0"/>
+              </a:buClr>
+              <a:buSzPct val="80000"/>
+              <a:buFont typeface="Wingdings" pitchFamily="2" charset="2"/>
+              <a:buChar char="u"/>
+            </a:pPr>
+            <a:r>
+              <a:rPr lang="en-US" sz="1800" dirty="0">
+                <a:solidFill>
+                  <a:schemeClr val="tx1"/>
+                </a:solidFill>
+              </a:rPr>
+              <a:t>Note: detectron2 cannot </a:t>
+            </a:r>
+            <a:r>
+              <a:rPr lang="en-US" sz="1800">
+                <a:solidFill>
+                  <a:schemeClr val="tx1"/>
+                </a:solidFill>
+              </a:rPr>
+              <a:t>install under </a:t>
+            </a:r>
+            <a:r>
+              <a:rPr lang="en-US" sz="1800" dirty="0">
+                <a:solidFill>
+                  <a:schemeClr val="tx1"/>
+                </a:solidFill>
+              </a:rPr>
+              <a:t>window 10</a:t>
+            </a:r>
+          </a:p>
+        </p:txBody>
+      </p:sp>
+      <p:sp>
+        <p:nvSpPr>
+          <p:cNvPr id="4" name="標題 1"/>
+          <p:cNvSpPr txBox="1">
+            <a:spLocks/>
+          </p:cNvSpPr>
+          <p:nvPr/>
+        </p:nvSpPr>
+        <p:spPr>
+          <a:xfrm>
+            <a:off x="0" y="764704"/>
+            <a:ext cx="9144000" cy="360040"/>
+          </a:xfrm>
+          <a:prstGeom prst="rect">
+            <a:avLst/>
+          </a:prstGeom>
+          <a:gradFill flip="none" rotWithShape="1">
+            <a:gsLst>
+              <a:gs pos="0">
+                <a:srgbClr val="00B0F0">
+                  <a:shade val="30000"/>
+                  <a:satMod val="115000"/>
+                </a:srgbClr>
+              </a:gs>
+              <a:gs pos="50000">
+                <a:srgbClr val="00B0F0">
+                  <a:shade val="67500"/>
+                  <a:satMod val="115000"/>
+                </a:srgbClr>
+              </a:gs>
+              <a:gs pos="100000">
+                <a:srgbClr val="00B0F0">
+                  <a:shade val="100000"/>
+                  <a:satMod val="115000"/>
+                </a:srgbClr>
+              </a:gs>
+            </a:gsLst>
+            <a:path path="circle">
+              <a:fillToRect t="100000" r="100000"/>
+            </a:path>
+            <a:tileRect l="-100000" b="-100000"/>
+          </a:gradFill>
+        </p:spPr>
+        <p:txBody>
+          <a:bodyPr vert="horz" lIns="91440" tIns="45720" rIns="91440" bIns="45720" rtlCol="0" anchor="ctr">
+            <a:normAutofit/>
+          </a:bodyPr>
+          <a:lstStyle/>
+          <a:p>
+            <a:pPr lvl="0">
+              <a:spcBef>
+                <a:spcPct val="0"/>
+              </a:spcBef>
+            </a:pPr>
+            <a:r>
+              <a:rPr lang="en-US" sz="1600" dirty="0">
+                <a:hlinkClick r:id="rId3"/>
+              </a:rPr>
+              <a:t>https://colab.research.google.com/drive/16jcaJoc6bCFAQ96jDe2HwtXj7BMD_-m5#scrollTo=QHnVupBBn9eR</a:t>
+            </a:r>
+            <a:endParaRPr kumimoji="0" lang="zh-TW" altLang="en-US" sz="1600" b="0" i="0" u="none" strike="noStrike" kern="1200" cap="none" spc="0" normalizeH="0" baseline="0" noProof="0" dirty="0">
+              <a:ln>
+                <a:noFill/>
+              </a:ln>
+              <a:solidFill>
+                <a:schemeClr val="tx1"/>
+              </a:solidFill>
+              <a:effectLst/>
+              <a:uLnTx/>
+              <a:uFillTx/>
+              <a:latin typeface="+mj-lt"/>
+              <a:ea typeface="+mj-ea"/>
+              <a:cs typeface="+mj-cs"/>
+            </a:endParaRPr>
+          </a:p>
+        </p:txBody>
+      </p:sp>
+      <p:sp>
+        <p:nvSpPr>
+          <p:cNvPr id="5" name="日期版面配置區 4"/>
+          <p:cNvSpPr>
+            <a:spLocks noGrp="1"/>
+          </p:cNvSpPr>
+          <p:nvPr>
+            <p:ph type="dt" sz="half" idx="10"/>
+          </p:nvPr>
+        </p:nvSpPr>
+        <p:spPr/>
+        <p:txBody>
+          <a:bodyPr/>
+          <a:lstStyle/>
+          <a:p>
+            <a:fld id="{A4F910E6-8D00-4BAF-8C48-9688E0B449D3}" type="datetime1">
+              <a:rPr lang="zh-TW" altLang="en-US" smtClean="0"/>
+              <a:pPr/>
+              <a:t>2020/5/14</a:t>
+            </a:fld>
+            <a:endParaRPr lang="zh-TW" altLang="en-US"/>
+          </a:p>
+        </p:txBody>
+      </p:sp>
+      <p:sp>
+        <p:nvSpPr>
+          <p:cNvPr id="6" name="投影片編號版面配置區 5"/>
+          <p:cNvSpPr>
+            <a:spLocks noGrp="1"/>
+          </p:cNvSpPr>
+          <p:nvPr>
+            <p:ph type="sldNum" sz="quarter" idx="12"/>
+          </p:nvPr>
+        </p:nvSpPr>
+        <p:spPr/>
+        <p:txBody>
+          <a:bodyPr/>
+          <a:lstStyle/>
+          <a:p>
+            <a:fld id="{E4D7E63D-91F2-4366-A2C4-1B00C9E2590E}" type="slidenum">
+              <a:rPr lang="zh-TW" altLang="en-US" smtClean="0"/>
+              <a:pPr/>
+              <a:t>4</a:t>
+            </a:fld>
+            <a:endParaRPr lang="zh-TW" altLang="en-US"/>
+          </a:p>
+        </p:txBody>
+      </p:sp>
+      <p:pic>
+        <p:nvPicPr>
+          <p:cNvPr id="10" name="Picture 9">
+            <a:extLst>
+              <a:ext uri="{FF2B5EF4-FFF2-40B4-BE49-F238E27FC236}">
+                <a16:creationId xmlns:a16="http://schemas.microsoft.com/office/drawing/2014/main" id="{D1FBFDB1-8BFD-466B-977C-3727EBDC93BE}"/>
+              </a:ext>
+            </a:extLst>
+          </p:cNvPr>
+          <p:cNvPicPr>
+            <a:picLocks noChangeAspect="1"/>
+          </p:cNvPicPr>
+          <p:nvPr/>
+        </p:nvPicPr>
+        <p:blipFill>
+          <a:blip r:embed="rId4"/>
+          <a:stretch>
+            <a:fillRect/>
+          </a:stretch>
+        </p:blipFill>
+        <p:spPr>
+          <a:xfrm>
+            <a:off x="547188" y="3365255"/>
+            <a:ext cx="8567936" cy="1423540"/>
+          </a:xfrm>
+          <a:prstGeom prst="rect">
+            <a:avLst/>
+          </a:prstGeom>
+          <a:ln>
+            <a:solidFill>
+              <a:srgbClr val="C00000"/>
+            </a:solidFill>
+          </a:ln>
+        </p:spPr>
+      </p:pic>
+    </p:spTree>
+    <p:extLst>
+      <p:ext uri="{BB962C8B-B14F-4D97-AF65-F5344CB8AC3E}">
+        <p14:creationId xmlns:p14="http://schemas.microsoft.com/office/powerpoint/2010/main" val="2726512774"/>
+      </p:ext>
+    </p:extLst>
+  </p:cSld>
+  <p:clrMapOvr>
+    <a:masterClrMapping/>
+  </p:clrMapOvr>
+</p:sld>
+</file>
+
+<file path=ppt/slides/slide5.xml><?xml version="1.0" encoding="utf-8"?>
+<p:sld xmlns:a="http://schemas.openxmlformats.org/drawingml/2006/main" xmlns:r="http://schemas.openxmlformats.org/officeDocument/2006/relationships" xmlns:p="http://schemas.openxmlformats.org/presentationml/2006/main">
+  <p:cSld>
+    <p:spTree>
+      <p:nvGrpSpPr>
+        <p:cNvPr id="1" name=""/>
+        <p:cNvGrpSpPr/>
+        <p:nvPr/>
+      </p:nvGrpSpPr>
+      <p:grpSpPr>
+        <a:xfrm>
+          <a:off x="0" y="0"/>
+          <a:ext cx="0" cy="0"/>
+          <a:chOff x="0" y="0"/>
+          <a:chExt cx="0" cy="0"/>
+        </a:xfrm>
+      </p:grpSpPr>
+      <p:sp>
+        <p:nvSpPr>
+          <p:cNvPr id="2" name="標題 1"/>
+          <p:cNvSpPr>
+            <a:spLocks noGrp="1"/>
+          </p:cNvSpPr>
+          <p:nvPr>
+            <p:ph type="ctrTitle"/>
+          </p:nvPr>
+        </p:nvSpPr>
+        <p:spPr>
+          <a:xfrm>
+            <a:off x="0" y="1"/>
+            <a:ext cx="9144000" cy="764704"/>
+          </a:xfrm>
+          <a:gradFill flip="none" rotWithShape="1">
+            <a:gsLst>
+              <a:gs pos="0">
+                <a:srgbClr val="C00000">
+                  <a:shade val="30000"/>
+                  <a:satMod val="115000"/>
+                </a:srgbClr>
+              </a:gs>
+              <a:gs pos="50000">
+                <a:srgbClr val="C00000">
+                  <a:shade val="67500"/>
+                  <a:satMod val="115000"/>
+                </a:srgbClr>
+              </a:gs>
+              <a:gs pos="100000">
+                <a:srgbClr val="C00000">
+                  <a:shade val="100000"/>
+                  <a:satMod val="115000"/>
+                </a:srgbClr>
+              </a:gs>
+            </a:gsLst>
+            <a:path path="circle">
+              <a:fillToRect t="100000" r="100000"/>
+            </a:path>
+            <a:tileRect l="-100000" b="-100000"/>
+          </a:gradFill>
+        </p:spPr>
+        <p:txBody>
+          <a:bodyPr>
+            <a:normAutofit/>
+          </a:bodyPr>
+          <a:lstStyle/>
+          <a:p>
+            <a:pPr algn="l"/>
+            <a:r>
+              <a:rPr lang="en-US" altLang="zh-TW" b="1" dirty="0">
+                <a:solidFill>
+                  <a:srgbClr val="FFFF00"/>
+                </a:solidFill>
+              </a:rPr>
+              <a:t>5 Implement</a:t>
+            </a:r>
+            <a:endParaRPr lang="zh-TW" altLang="en-US" b="1" dirty="0">
+              <a:solidFill>
+                <a:srgbClr val="FFFF00"/>
+              </a:solidFill>
+            </a:endParaRPr>
+          </a:p>
+        </p:txBody>
+      </p:sp>
+      <p:sp>
+        <p:nvSpPr>
+          <p:cNvPr id="3" name="副標題 2"/>
+          <p:cNvSpPr>
+            <a:spLocks noGrp="1"/>
+          </p:cNvSpPr>
+          <p:nvPr>
+            <p:ph type="subTitle" idx="1"/>
+          </p:nvPr>
+        </p:nvSpPr>
+        <p:spPr>
+          <a:xfrm>
+            <a:off x="467544" y="1268759"/>
+            <a:ext cx="8352928" cy="1423540"/>
+          </a:xfrm>
+          <a:ln>
+            <a:solidFill>
+              <a:srgbClr val="C00000"/>
+            </a:solidFill>
+          </a:ln>
+        </p:spPr>
+        <p:txBody>
+          <a:bodyPr>
+            <a:noAutofit/>
+          </a:bodyPr>
+          <a:lstStyle/>
+          <a:p>
+            <a:pPr marL="342900" indent="-342900" algn="l">
+              <a:buClr>
+                <a:srgbClr val="0070C0"/>
+              </a:buClr>
+              <a:buSzPct val="80000"/>
+              <a:buFont typeface="Wingdings" pitchFamily="2" charset="2"/>
+              <a:buChar char="u"/>
+            </a:pPr>
+            <a:r>
+              <a:rPr lang="en-US" sz="1800" b="1" dirty="0">
+                <a:solidFill>
+                  <a:srgbClr val="C00000"/>
+                </a:solidFill>
+              </a:rPr>
+              <a:t>Restart the computer</a:t>
+            </a:r>
+            <a:endParaRPr lang="en-US" altLang="en-US" sz="4400" b="1" dirty="0">
+              <a:solidFill>
+                <a:srgbClr val="C00000"/>
+              </a:solidFill>
+              <a:latin typeface="Arial" panose="020B0604020202020204" pitchFamily="34" charset="0"/>
+            </a:endParaRPr>
+          </a:p>
+          <a:p>
+            <a:pPr marL="342900" indent="-342900" algn="l">
+              <a:buClr>
+                <a:srgbClr val="0070C0"/>
+              </a:buClr>
+              <a:buSzPct val="80000"/>
+              <a:buFont typeface="Wingdings" pitchFamily="2" charset="2"/>
+              <a:buChar char="u"/>
+            </a:pPr>
+            <a:endParaRPr lang="en-US" sz="1800" dirty="0">
+              <a:solidFill>
+                <a:schemeClr val="tx1"/>
+              </a:solidFill>
+            </a:endParaRPr>
+          </a:p>
+        </p:txBody>
+      </p:sp>
+      <p:sp>
+        <p:nvSpPr>
+          <p:cNvPr id="4" name="標題 1"/>
+          <p:cNvSpPr txBox="1">
+            <a:spLocks/>
+          </p:cNvSpPr>
+          <p:nvPr/>
+        </p:nvSpPr>
+        <p:spPr>
+          <a:xfrm>
+            <a:off x="0" y="764704"/>
+            <a:ext cx="9144000" cy="360040"/>
+          </a:xfrm>
+          <a:prstGeom prst="rect">
+            <a:avLst/>
+          </a:prstGeom>
+          <a:gradFill flip="none" rotWithShape="1">
+            <a:gsLst>
+              <a:gs pos="0">
+                <a:srgbClr val="00B0F0">
+                  <a:shade val="30000"/>
+                  <a:satMod val="115000"/>
+                </a:srgbClr>
+              </a:gs>
+              <a:gs pos="50000">
+                <a:srgbClr val="00B0F0">
+                  <a:shade val="67500"/>
+                  <a:satMod val="115000"/>
+                </a:srgbClr>
+              </a:gs>
+              <a:gs pos="100000">
+                <a:srgbClr val="00B0F0">
+                  <a:shade val="100000"/>
+                  <a:satMod val="115000"/>
+                </a:srgbClr>
+              </a:gs>
+            </a:gsLst>
+            <a:path path="circle">
+              <a:fillToRect t="100000" r="100000"/>
+            </a:path>
+            <a:tileRect l="-100000" b="-100000"/>
+          </a:gradFill>
+        </p:spPr>
+        <p:txBody>
+          <a:bodyPr vert="horz" lIns="91440" tIns="45720" rIns="91440" bIns="45720" rtlCol="0" anchor="ctr">
+            <a:normAutofit/>
+          </a:bodyPr>
+          <a:lstStyle/>
+          <a:p>
+            <a:pPr lvl="0">
+              <a:spcBef>
+                <a:spcPct val="0"/>
+              </a:spcBef>
+            </a:pPr>
+            <a:r>
+              <a:rPr lang="en-US" sz="1600" dirty="0">
+                <a:hlinkClick r:id="rId2"/>
+              </a:rPr>
+              <a:t>https://colab.research.google.com/drive/16jcaJoc6bCFAQ96jDe2HwtXj7BMD_-m5#scrollTo=QHnVupBBn9eR</a:t>
+            </a:r>
+            <a:endParaRPr kumimoji="0" lang="zh-TW" altLang="en-US" sz="1600" b="0" i="0" u="none" strike="noStrike" kern="1200" cap="none" spc="0" normalizeH="0" baseline="0" noProof="0" dirty="0">
+              <a:ln>
+                <a:noFill/>
+              </a:ln>
+              <a:solidFill>
+                <a:schemeClr val="tx1"/>
+              </a:solidFill>
+              <a:effectLst/>
+              <a:uLnTx/>
+              <a:uFillTx/>
+              <a:latin typeface="+mj-lt"/>
+              <a:ea typeface="+mj-ea"/>
+              <a:cs typeface="+mj-cs"/>
+            </a:endParaRPr>
+          </a:p>
+        </p:txBody>
+      </p:sp>
+      <p:sp>
+        <p:nvSpPr>
+          <p:cNvPr id="5" name="日期版面配置區 4"/>
+          <p:cNvSpPr>
+            <a:spLocks noGrp="1"/>
+          </p:cNvSpPr>
+          <p:nvPr>
+            <p:ph type="dt" sz="half" idx="10"/>
+          </p:nvPr>
+        </p:nvSpPr>
+        <p:spPr/>
+        <p:txBody>
+          <a:bodyPr/>
+          <a:lstStyle/>
+          <a:p>
+            <a:fld id="{A4F910E6-8D00-4BAF-8C48-9688E0B449D3}" type="datetime1">
+              <a:rPr lang="zh-TW" altLang="en-US" smtClean="0"/>
+              <a:pPr/>
+              <a:t>2020/5/14</a:t>
+            </a:fld>
+            <a:endParaRPr lang="zh-TW" altLang="en-US"/>
+          </a:p>
+        </p:txBody>
+      </p:sp>
+      <p:sp>
+        <p:nvSpPr>
+          <p:cNvPr id="6" name="投影片編號版面配置區 5"/>
+          <p:cNvSpPr>
+            <a:spLocks noGrp="1"/>
+          </p:cNvSpPr>
+          <p:nvPr>
+            <p:ph type="sldNum" sz="quarter" idx="12"/>
+          </p:nvPr>
+        </p:nvSpPr>
+        <p:spPr/>
+        <p:txBody>
+          <a:bodyPr/>
+          <a:lstStyle/>
+          <a:p>
+            <a:fld id="{E4D7E63D-91F2-4366-A2C4-1B00C9E2590E}" type="slidenum">
+              <a:rPr lang="zh-TW" altLang="en-US" smtClean="0"/>
+              <a:pPr/>
+              <a:t>5</a:t>
+            </a:fld>
+            <a:endParaRPr lang="zh-TW" altLang="en-US"/>
+          </a:p>
+        </p:txBody>
+      </p:sp>
+    </p:spTree>
+    <p:extLst>
+      <p:ext uri="{BB962C8B-B14F-4D97-AF65-F5344CB8AC3E}">
+        <p14:creationId xmlns:p14="http://schemas.microsoft.com/office/powerpoint/2010/main" val="3640693959"/>
+      </p:ext>
+    </p:extLst>
+  </p:cSld>
+  <p:clrMapOvr>
+    <a:masterClrMapping/>
+  </p:clrMapOvr>
+</p:sld>
+</file>
+
+<file path=ppt/slides/slide6.xml><?xml version="1.0" encoding="utf-8"?>
+<p:sld xmlns:a="http://schemas.openxmlformats.org/drawingml/2006/main" xmlns:r="http://schemas.openxmlformats.org/officeDocument/2006/relationships" xmlns:p="http://schemas.openxmlformats.org/presentationml/2006/main">
+  <p:cSld>
+    <p:spTree>
+      <p:nvGrpSpPr>
+        <p:cNvPr id="1" name=""/>
+        <p:cNvGrpSpPr/>
+        <p:nvPr/>
+      </p:nvGrpSpPr>
+      <p:grpSpPr>
+        <a:xfrm>
+          <a:off x="0" y="0"/>
+          <a:ext cx="0" cy="0"/>
+          <a:chOff x="0" y="0"/>
+          <a:chExt cx="0" cy="0"/>
+        </a:xfrm>
+      </p:grpSpPr>
+      <p:sp>
+        <p:nvSpPr>
+          <p:cNvPr id="2" name="標題 1"/>
+          <p:cNvSpPr>
+            <a:spLocks noGrp="1"/>
+          </p:cNvSpPr>
+          <p:nvPr>
+            <p:ph type="ctrTitle"/>
+          </p:nvPr>
+        </p:nvSpPr>
+        <p:spPr>
+          <a:xfrm>
+            <a:off x="0" y="1"/>
+            <a:ext cx="9144000" cy="764704"/>
+          </a:xfrm>
+          <a:gradFill flip="none" rotWithShape="1">
+            <a:gsLst>
+              <a:gs pos="0">
+                <a:srgbClr val="C00000">
+                  <a:shade val="30000"/>
+                  <a:satMod val="115000"/>
+                </a:srgbClr>
+              </a:gs>
+              <a:gs pos="50000">
+                <a:srgbClr val="C00000">
+                  <a:shade val="67500"/>
+                  <a:satMod val="115000"/>
+                </a:srgbClr>
+              </a:gs>
+              <a:gs pos="100000">
+                <a:srgbClr val="C00000">
+                  <a:shade val="100000"/>
+                  <a:satMod val="115000"/>
+                </a:srgbClr>
+              </a:gs>
+            </a:gsLst>
+            <a:path path="circle">
+              <a:fillToRect t="100000" r="100000"/>
+            </a:path>
+            <a:tileRect l="-100000" b="-100000"/>
+          </a:gradFill>
+        </p:spPr>
+        <p:txBody>
+          <a:bodyPr>
+            <a:normAutofit/>
+          </a:bodyPr>
+          <a:lstStyle/>
+          <a:p>
+            <a:pPr algn="l"/>
+            <a:r>
+              <a:rPr lang="en-US" altLang="zh-TW" b="1" dirty="0">
+                <a:solidFill>
+                  <a:srgbClr val="FFFF00"/>
+                </a:solidFill>
+              </a:rPr>
+              <a:t>5 Implement</a:t>
+            </a:r>
+            <a:endParaRPr lang="zh-TW" altLang="en-US" b="1" dirty="0">
+              <a:solidFill>
+                <a:srgbClr val="FFFF00"/>
+              </a:solidFill>
+            </a:endParaRPr>
+          </a:p>
+        </p:txBody>
+      </p:sp>
+      <p:sp>
+        <p:nvSpPr>
+          <p:cNvPr id="3" name="副標題 2"/>
+          <p:cNvSpPr>
+            <a:spLocks noGrp="1"/>
+          </p:cNvSpPr>
+          <p:nvPr>
+            <p:ph type="subTitle" idx="1"/>
+          </p:nvPr>
+        </p:nvSpPr>
+        <p:spPr>
+          <a:xfrm>
+            <a:off x="467544" y="1268759"/>
+            <a:ext cx="8352928" cy="1423540"/>
+          </a:xfrm>
+          <a:ln>
+            <a:solidFill>
+              <a:srgbClr val="C00000"/>
+            </a:solidFill>
+          </a:ln>
+        </p:spPr>
+        <p:txBody>
+          <a:bodyPr>
+            <a:noAutofit/>
+          </a:bodyPr>
+          <a:lstStyle/>
+          <a:p>
+            <a:pPr marL="342900" indent="-342900" algn="l">
+              <a:buClr>
+                <a:srgbClr val="0070C0"/>
+              </a:buClr>
+              <a:buSzPct val="80000"/>
+              <a:buFont typeface="Wingdings" pitchFamily="2" charset="2"/>
+              <a:buChar char="u"/>
+            </a:pPr>
+            <a:r>
+              <a:rPr lang="en-US" sz="1800" dirty="0">
+                <a:hlinkClick r:id="rId2"/>
+              </a:rPr>
+              <a:t>https://github.com/facebookresearch/detectron2/blob/master/INSTALL.md</a:t>
+            </a:r>
+            <a:endParaRPr lang="en-US" sz="1800" dirty="0"/>
+          </a:p>
+          <a:p>
+            <a:pPr marL="342900" indent="-342900" algn="l">
+              <a:buClr>
+                <a:srgbClr val="0070C0"/>
+              </a:buClr>
+              <a:buSzPct val="80000"/>
+              <a:buFont typeface="Wingdings" pitchFamily="2" charset="2"/>
+              <a:buChar char="u"/>
+            </a:pPr>
+            <a:r>
+              <a:rPr lang="en-US" sz="1800" dirty="0">
+                <a:solidFill>
+                  <a:schemeClr val="tx1"/>
+                </a:solidFill>
+              </a:rPr>
+              <a:t>9:56/1:07:20</a:t>
+            </a:r>
+          </a:p>
+          <a:p>
+            <a:pPr marL="342900" indent="-342900" algn="l">
+              <a:buClr>
+                <a:srgbClr val="0070C0"/>
+              </a:buClr>
+              <a:buSzPct val="80000"/>
+              <a:buFont typeface="Wingdings" pitchFamily="2" charset="2"/>
+              <a:buChar char="u"/>
+            </a:pPr>
+            <a:r>
+              <a:rPr lang="en-US" altLang="en-US" sz="1800" dirty="0">
+                <a:solidFill>
+                  <a:srgbClr val="24292E"/>
+                </a:solidFill>
+                <a:latin typeface="SFMono-Regular"/>
+              </a:rPr>
+              <a:t>&gt; git clone https://github.com/facebookresearch/detectron2.git </a:t>
+            </a:r>
+          </a:p>
+          <a:p>
+            <a:pPr marL="342900" indent="-342900" algn="l">
+              <a:buClr>
+                <a:srgbClr val="0070C0"/>
+              </a:buClr>
+              <a:buSzPct val="80000"/>
+              <a:buFont typeface="Wingdings" pitchFamily="2" charset="2"/>
+              <a:buChar char="u"/>
+            </a:pPr>
+            <a:r>
+              <a:rPr lang="en-US" altLang="en-US" sz="1800" dirty="0">
+                <a:solidFill>
+                  <a:srgbClr val="24292E"/>
+                </a:solidFill>
+                <a:latin typeface="SFMono-Regular"/>
+              </a:rPr>
+              <a:t>&gt; python -m pip install -e detectron2</a:t>
+            </a:r>
+            <a:r>
+              <a:rPr lang="en-US" altLang="en-US" sz="800" dirty="0">
+                <a:solidFill>
+                  <a:schemeClr val="tx1"/>
+                </a:solidFill>
+              </a:rPr>
+              <a:t> </a:t>
+            </a:r>
+            <a:endParaRPr lang="en-US" altLang="en-US" sz="4400" dirty="0">
+              <a:solidFill>
+                <a:schemeClr val="tx1"/>
+              </a:solidFill>
+              <a:latin typeface="Arial" panose="020B0604020202020204" pitchFamily="34" charset="0"/>
+            </a:endParaRPr>
+          </a:p>
+          <a:p>
+            <a:pPr marL="342900" indent="-342900" algn="l">
+              <a:buClr>
+                <a:srgbClr val="0070C0"/>
+              </a:buClr>
+              <a:buSzPct val="80000"/>
+              <a:buFont typeface="Wingdings" pitchFamily="2" charset="2"/>
+              <a:buChar char="u"/>
+            </a:pPr>
+            <a:endParaRPr lang="en-US" sz="1800" dirty="0">
+              <a:solidFill>
+                <a:schemeClr val="tx1"/>
+              </a:solidFill>
+            </a:endParaRPr>
+          </a:p>
+        </p:txBody>
+      </p:sp>
+      <p:sp>
+        <p:nvSpPr>
+          <p:cNvPr id="4" name="標題 1"/>
+          <p:cNvSpPr txBox="1">
+            <a:spLocks/>
+          </p:cNvSpPr>
+          <p:nvPr/>
+        </p:nvSpPr>
+        <p:spPr>
+          <a:xfrm>
+            <a:off x="0" y="764704"/>
+            <a:ext cx="9144000" cy="360040"/>
+          </a:xfrm>
+          <a:prstGeom prst="rect">
+            <a:avLst/>
+          </a:prstGeom>
+          <a:gradFill flip="none" rotWithShape="1">
+            <a:gsLst>
+              <a:gs pos="0">
+                <a:srgbClr val="00B0F0">
+                  <a:shade val="30000"/>
+                  <a:satMod val="115000"/>
+                </a:srgbClr>
+              </a:gs>
+              <a:gs pos="50000">
+                <a:srgbClr val="00B0F0">
+                  <a:shade val="67500"/>
+                  <a:satMod val="115000"/>
+                </a:srgbClr>
+              </a:gs>
+              <a:gs pos="100000">
+                <a:srgbClr val="00B0F0">
+                  <a:shade val="100000"/>
+                  <a:satMod val="115000"/>
+                </a:srgbClr>
+              </a:gs>
+            </a:gsLst>
+            <a:path path="circle">
+              <a:fillToRect t="100000" r="100000"/>
+            </a:path>
+            <a:tileRect l="-100000" b="-100000"/>
+          </a:gradFill>
+        </p:spPr>
+        <p:txBody>
+          <a:bodyPr vert="horz" lIns="91440" tIns="45720" rIns="91440" bIns="45720" rtlCol="0" anchor="ctr">
+            <a:normAutofit/>
+          </a:bodyPr>
+          <a:lstStyle/>
+          <a:p>
+            <a:pPr lvl="0">
+              <a:spcBef>
+                <a:spcPct val="0"/>
+              </a:spcBef>
+            </a:pPr>
+            <a:r>
+              <a:rPr lang="en-US" sz="1600" dirty="0">
+                <a:hlinkClick r:id="rId3"/>
+              </a:rPr>
+              <a:t>https://colab.research.google.com/drive/16jcaJoc6bCFAQ96jDe2HwtXj7BMD_-m5#scrollTo=QHnVupBBn9eR</a:t>
+            </a:r>
+            <a:endParaRPr kumimoji="0" lang="zh-TW" altLang="en-US" sz="1600" b="0" i="0" u="none" strike="noStrike" kern="1200" cap="none" spc="0" normalizeH="0" baseline="0" noProof="0" dirty="0">
+              <a:ln>
+                <a:noFill/>
+              </a:ln>
+              <a:solidFill>
+                <a:schemeClr val="tx1"/>
+              </a:solidFill>
+              <a:effectLst/>
+              <a:uLnTx/>
+              <a:uFillTx/>
+              <a:latin typeface="+mj-lt"/>
+              <a:ea typeface="+mj-ea"/>
+              <a:cs typeface="+mj-cs"/>
+            </a:endParaRPr>
+          </a:p>
+        </p:txBody>
+      </p:sp>
+      <p:sp>
+        <p:nvSpPr>
+          <p:cNvPr id="5" name="日期版面配置區 4"/>
+          <p:cNvSpPr>
+            <a:spLocks noGrp="1"/>
+          </p:cNvSpPr>
+          <p:nvPr>
+            <p:ph type="dt" sz="half" idx="10"/>
+          </p:nvPr>
+        </p:nvSpPr>
+        <p:spPr/>
+        <p:txBody>
+          <a:bodyPr/>
+          <a:lstStyle/>
+          <a:p>
+            <a:fld id="{A4F910E6-8D00-4BAF-8C48-9688E0B449D3}" type="datetime1">
+              <a:rPr lang="zh-TW" altLang="en-US" smtClean="0"/>
+              <a:pPr/>
+              <a:t>2020/5/14</a:t>
+            </a:fld>
+            <a:endParaRPr lang="zh-TW" altLang="en-US"/>
+          </a:p>
+        </p:txBody>
+      </p:sp>
+      <p:sp>
+        <p:nvSpPr>
+          <p:cNvPr id="6" name="投影片編號版面配置區 5"/>
+          <p:cNvSpPr>
+            <a:spLocks noGrp="1"/>
+          </p:cNvSpPr>
+          <p:nvPr>
+            <p:ph type="sldNum" sz="quarter" idx="12"/>
+          </p:nvPr>
+        </p:nvSpPr>
+        <p:spPr/>
+        <p:txBody>
+          <a:bodyPr/>
+          <a:lstStyle/>
+          <a:p>
+            <a:fld id="{E4D7E63D-91F2-4366-A2C4-1B00C9E2590E}" type="slidenum">
+              <a:rPr lang="zh-TW" altLang="en-US" smtClean="0"/>
+              <a:pPr/>
+              <a:t>6</a:t>
+            </a:fld>
+            <a:endParaRPr lang="zh-TW" altLang="en-US"/>
+          </a:p>
+        </p:txBody>
+      </p:sp>
+    </p:spTree>
+    <p:extLst>
+      <p:ext uri="{BB962C8B-B14F-4D97-AF65-F5344CB8AC3E}">
+        <p14:creationId xmlns:p14="http://schemas.microsoft.com/office/powerpoint/2010/main" val="987816732"/>
+      </p:ext>
+    </p:extLst>
+  </p:cSld>
+  <p:clrMapOvr>
+    <a:masterClrMapping/>
+  </p:clrMapOvr>
+</p:sld>
+</file>
+
+<file path=ppt/slides/slide7.xml><?xml version="1.0" encoding="utf-8"?>
+<p:sld xmlns:a="http://schemas.openxmlformats.org/drawingml/2006/main" xmlns:r="http://schemas.openxmlformats.org/officeDocument/2006/relationships" xmlns:p="http://schemas.openxmlformats.org/presentationml/2006/main">
+  <p:cSld>
+    <p:spTree>
+      <p:nvGrpSpPr>
+        <p:cNvPr id="1" name=""/>
+        <p:cNvGrpSpPr/>
+        <p:nvPr/>
+      </p:nvGrpSpPr>
+      <p:grpSpPr>
+        <a:xfrm>
+          <a:off x="0" y="0"/>
+          <a:ext cx="0" cy="0"/>
+          <a:chOff x="0" y="0"/>
+          <a:chExt cx="0" cy="0"/>
+        </a:xfrm>
+      </p:grpSpPr>
+      <p:sp>
+        <p:nvSpPr>
+          <p:cNvPr id="2" name="標題 1"/>
+          <p:cNvSpPr>
+            <a:spLocks noGrp="1"/>
+          </p:cNvSpPr>
+          <p:nvPr>
+            <p:ph type="ctrTitle"/>
+          </p:nvPr>
+        </p:nvSpPr>
+        <p:spPr>
+          <a:xfrm>
             <a:off x="0" y="2130425"/>
             <a:ext cx="9144000" cy="1470025"/>
           </a:xfrm>
@@ -4595,7 +5633,7 @@
             <a:fld id="{E4D7E63D-91F2-4366-A2C4-1B00C9E2590E}" type="slidenum">
               <a:rPr lang="zh-TW" altLang="en-US" smtClean="0"/>
               <a:pPr/>
-              <a:t>4</a:t>
+              <a:t>7</a:t>
             </a:fld>
             <a:endParaRPr lang="zh-TW" altLang="en-US"/>
           </a:p>

</xml_diff>